<commit_message>
minor updates to pptx
</commit_message>
<xml_diff>
--- a/hw5a/hw5aPresentation.pptx
+++ b/hw5a/hw5aPresentation.pptx
@@ -219,6 +219,11 @@
       </a:defRPr>
     </a:lvl9pPr>
   </p:defaultTextStyle>
+  <p:extLst>
+    <p:ext uri="{EFAFB233-063F-42B5-8137-9DF3F51BA10A}">
+      <p15:sldGuideLst xmlns:p15="http://schemas.microsoft.com/office/powerpoint/2012/main"/>
+    </p:ext>
+  </p:extLst>
 </p:presentation>
 </file>
 
@@ -831,7 +836,7 @@
         </p:nvSpPr>
         <p:spPr>
           <a:xfrm>
-            <a:off x="381300" y="685800"/>
+            <a:off x="381000" y="685800"/>
             <a:ext cx="6096000" cy="3429000"/>
           </a:xfrm>
           <a:custGeom>
@@ -6017,9 +6022,31 @@
               <a:buNone/>
             </a:pPr>
             <a:r>
-              <a:rPr lang="en" b="1"/>
-              <a:t>Data structure design:</a:t>
+              <a:rPr lang="en" b="1" dirty="0"/>
+              <a:t>Data structure design</a:t>
             </a:r>
+            <a:r>
+              <a:rPr lang="en" b="1" dirty="0" smtClean="0"/>
+              <a:t>:</a:t>
+            </a:r>
+            <a:endParaRPr lang="en-US" b="1" dirty="0" smtClean="0"/>
+          </a:p>
+          <a:p>
+            <a:pPr lvl="0">
+              <a:spcBef>
+                <a:spcPts val="0"/>
+              </a:spcBef>
+              <a:buNone/>
+            </a:pPr>
+            <a:r>
+              <a:rPr lang="en-US" dirty="0" smtClean="0"/>
+              <a:t>in Category package</a:t>
+            </a:r>
+            <a:r>
+              <a:rPr lang="en-US" dirty="0" smtClean="0"/>
+              <a:t> </a:t>
+            </a:r>
+            <a:endParaRPr lang="en" dirty="0"/>
           </a:p>
         </p:txBody>
       </p:sp>
@@ -6055,9 +6082,27 @@
               <a:buNone/>
             </a:pPr>
             <a:r>
-              <a:rPr lang="en" b="1"/>
-              <a:t>Plugin design:</a:t>
+              <a:rPr lang="en" b="1" dirty="0"/>
+              <a:t>Plugin design</a:t>
             </a:r>
+            <a:r>
+              <a:rPr lang="en" b="1" dirty="0" smtClean="0"/>
+              <a:t>:</a:t>
+            </a:r>
+            <a:endParaRPr lang="en-US" b="1" dirty="0" smtClean="0"/>
+          </a:p>
+          <a:p>
+            <a:pPr lvl="0" rtl="0">
+              <a:spcBef>
+                <a:spcPts val="0"/>
+              </a:spcBef>
+              <a:buNone/>
+            </a:pPr>
+            <a:r>
+              <a:rPr lang="en-US" dirty="0" smtClean="0"/>
+              <a:t>in Plugin package</a:t>
+            </a:r>
+            <a:endParaRPr lang="en" dirty="0"/>
           </a:p>
         </p:txBody>
       </p:sp>

</xml_diff>